<commit_message>
Updated topic table and flow chart
</commit_message>
<xml_diff>
--- a/Diagrams/flow.pptx
+++ b/Diagrams/flow.pptx
@@ -154,7 +154,7 @@
           </a:lstStyle>
           <a:p>
             <a:r>
-              <a:rPr lang="en-US" smtClean="0"/>
+              <a:rPr lang="en-US"/>
               <a:t>Click to edit Master title style</a:t>
             </a:r>
             <a:endParaRPr lang="en-US" dirty="0"/>
@@ -219,7 +219,7 @@
           </a:lstStyle>
           <a:p>
             <a:r>
-              <a:rPr lang="en-US" smtClean="0"/>
+              <a:rPr lang="en-US"/>
               <a:t>Click to edit Master subtitle style</a:t>
             </a:r>
             <a:endParaRPr lang="en-US" dirty="0"/>
@@ -243,7 +243,7 @@
           <a:p>
             <a:fld id="{C9B7F90D-19C5-FD43-B6A2-9EB007BFA57B}" type="datetimeFigureOut">
               <a:rPr lang="en-US" smtClean="0"/>
-              <a:t>4/16/21</a:t>
+              <a:t>2/8/23</a:t>
             </a:fld>
             <a:endParaRPr lang="en-US"/>
           </a:p>
@@ -332,7 +332,7 @@
           <a:lstStyle/>
           <a:p>
             <a:r>
-              <a:rPr lang="en-US" smtClean="0"/>
+              <a:rPr lang="en-US"/>
               <a:t>Click to edit Master title style</a:t>
             </a:r>
             <a:endParaRPr lang="en-US" dirty="0"/>
@@ -356,35 +356,35 @@
           <a:p>
             <a:pPr lvl="0"/>
             <a:r>
-              <a:rPr lang="en-US" smtClean="0"/>
+              <a:rPr lang="en-US"/>
               <a:t>Click to edit Master text styles</a:t>
             </a:r>
           </a:p>
           <a:p>
             <a:pPr lvl="1"/>
             <a:r>
-              <a:rPr lang="en-US" smtClean="0"/>
+              <a:rPr lang="en-US"/>
               <a:t>Second level</a:t>
             </a:r>
           </a:p>
           <a:p>
             <a:pPr lvl="2"/>
             <a:r>
-              <a:rPr lang="en-US" smtClean="0"/>
+              <a:rPr lang="en-US"/>
               <a:t>Third level</a:t>
             </a:r>
           </a:p>
           <a:p>
             <a:pPr lvl="3"/>
             <a:r>
-              <a:rPr lang="en-US" smtClean="0"/>
+              <a:rPr lang="en-US"/>
               <a:t>Fourth level</a:t>
             </a:r>
           </a:p>
           <a:p>
             <a:pPr lvl="4"/>
             <a:r>
-              <a:rPr lang="en-US" smtClean="0"/>
+              <a:rPr lang="en-US"/>
               <a:t>Fifth level</a:t>
             </a:r>
             <a:endParaRPr lang="en-US" dirty="0"/>
@@ -408,7 +408,7 @@
           <a:p>
             <a:fld id="{C9B7F90D-19C5-FD43-B6A2-9EB007BFA57B}" type="datetimeFigureOut">
               <a:rPr lang="en-US" smtClean="0"/>
-              <a:t>4/16/21</a:t>
+              <a:t>2/8/23</a:t>
             </a:fld>
             <a:endParaRPr lang="en-US"/>
           </a:p>
@@ -502,7 +502,7 @@
           <a:lstStyle/>
           <a:p>
             <a:r>
-              <a:rPr lang="en-US" smtClean="0"/>
+              <a:rPr lang="en-US"/>
               <a:t>Click to edit Master title style</a:t>
             </a:r>
             <a:endParaRPr lang="en-US" dirty="0"/>
@@ -531,35 +531,35 @@
           <a:p>
             <a:pPr lvl="0"/>
             <a:r>
-              <a:rPr lang="en-US" smtClean="0"/>
+              <a:rPr lang="en-US"/>
               <a:t>Click to edit Master text styles</a:t>
             </a:r>
           </a:p>
           <a:p>
             <a:pPr lvl="1"/>
             <a:r>
-              <a:rPr lang="en-US" smtClean="0"/>
+              <a:rPr lang="en-US"/>
               <a:t>Second level</a:t>
             </a:r>
           </a:p>
           <a:p>
             <a:pPr lvl="2"/>
             <a:r>
-              <a:rPr lang="en-US" smtClean="0"/>
+              <a:rPr lang="en-US"/>
               <a:t>Third level</a:t>
             </a:r>
           </a:p>
           <a:p>
             <a:pPr lvl="3"/>
             <a:r>
-              <a:rPr lang="en-US" smtClean="0"/>
+              <a:rPr lang="en-US"/>
               <a:t>Fourth level</a:t>
             </a:r>
           </a:p>
           <a:p>
             <a:pPr lvl="4"/>
             <a:r>
-              <a:rPr lang="en-US" smtClean="0"/>
+              <a:rPr lang="en-US"/>
               <a:t>Fifth level</a:t>
             </a:r>
             <a:endParaRPr lang="en-US" dirty="0"/>
@@ -583,7 +583,7 @@
           <a:p>
             <a:fld id="{C9B7F90D-19C5-FD43-B6A2-9EB007BFA57B}" type="datetimeFigureOut">
               <a:rPr lang="en-US" smtClean="0"/>
-              <a:t>4/16/21</a:t>
+              <a:t>2/8/23</a:t>
             </a:fld>
             <a:endParaRPr lang="en-US"/>
           </a:p>
@@ -672,7 +672,7 @@
           <a:lstStyle/>
           <a:p>
             <a:r>
-              <a:rPr lang="en-US" smtClean="0"/>
+              <a:rPr lang="en-US"/>
               <a:t>Click to edit Master title style</a:t>
             </a:r>
             <a:endParaRPr lang="en-US" dirty="0"/>
@@ -696,35 +696,35 @@
           <a:p>
             <a:pPr lvl="0"/>
             <a:r>
-              <a:rPr lang="en-US" smtClean="0"/>
+              <a:rPr lang="en-US"/>
               <a:t>Click to edit Master text styles</a:t>
             </a:r>
           </a:p>
           <a:p>
             <a:pPr lvl="1"/>
             <a:r>
-              <a:rPr lang="en-US" smtClean="0"/>
+              <a:rPr lang="en-US"/>
               <a:t>Second level</a:t>
             </a:r>
           </a:p>
           <a:p>
             <a:pPr lvl="2"/>
             <a:r>
-              <a:rPr lang="en-US" smtClean="0"/>
+              <a:rPr lang="en-US"/>
               <a:t>Third level</a:t>
             </a:r>
           </a:p>
           <a:p>
             <a:pPr lvl="3"/>
             <a:r>
-              <a:rPr lang="en-US" smtClean="0"/>
+              <a:rPr lang="en-US"/>
               <a:t>Fourth level</a:t>
             </a:r>
           </a:p>
           <a:p>
             <a:pPr lvl="4"/>
             <a:r>
-              <a:rPr lang="en-US" smtClean="0"/>
+              <a:rPr lang="en-US"/>
               <a:t>Fifth level</a:t>
             </a:r>
             <a:endParaRPr lang="en-US" dirty="0"/>
@@ -748,7 +748,7 @@
           <a:p>
             <a:fld id="{C9B7F90D-19C5-FD43-B6A2-9EB007BFA57B}" type="datetimeFigureOut">
               <a:rPr lang="en-US" smtClean="0"/>
-              <a:t>4/16/21</a:t>
+              <a:t>2/8/23</a:t>
             </a:fld>
             <a:endParaRPr lang="en-US"/>
           </a:p>
@@ -846,7 +846,7 @@
           </a:lstStyle>
           <a:p>
             <a:r>
-              <a:rPr lang="en-US" smtClean="0"/>
+              <a:rPr lang="en-US"/>
               <a:t>Click to edit Master title style</a:t>
             </a:r>
             <a:endParaRPr lang="en-US" dirty="0"/>
@@ -964,7 +964,7 @@
           <a:p>
             <a:pPr lvl="0"/>
             <a:r>
-              <a:rPr lang="en-US" smtClean="0"/>
+              <a:rPr lang="en-US"/>
               <a:t>Click to edit Master text styles</a:t>
             </a:r>
           </a:p>
@@ -987,7 +987,7 @@
           <a:p>
             <a:fld id="{C9B7F90D-19C5-FD43-B6A2-9EB007BFA57B}" type="datetimeFigureOut">
               <a:rPr lang="en-US" smtClean="0"/>
-              <a:t>4/16/21</a:t>
+              <a:t>2/8/23</a:t>
             </a:fld>
             <a:endParaRPr lang="en-US"/>
           </a:p>
@@ -1076,7 +1076,7 @@
           <a:lstStyle/>
           <a:p>
             <a:r>
-              <a:rPr lang="en-US" smtClean="0"/>
+              <a:rPr lang="en-US"/>
               <a:t>Click to edit Master title style</a:t>
             </a:r>
             <a:endParaRPr lang="en-US" dirty="0"/>
@@ -1105,35 +1105,35 @@
           <a:p>
             <a:pPr lvl="0"/>
             <a:r>
-              <a:rPr lang="en-US" smtClean="0"/>
+              <a:rPr lang="en-US"/>
               <a:t>Click to edit Master text styles</a:t>
             </a:r>
           </a:p>
           <a:p>
             <a:pPr lvl="1"/>
             <a:r>
-              <a:rPr lang="en-US" smtClean="0"/>
+              <a:rPr lang="en-US"/>
               <a:t>Second level</a:t>
             </a:r>
           </a:p>
           <a:p>
             <a:pPr lvl="2"/>
             <a:r>
-              <a:rPr lang="en-US" smtClean="0"/>
+              <a:rPr lang="en-US"/>
               <a:t>Third level</a:t>
             </a:r>
           </a:p>
           <a:p>
             <a:pPr lvl="3"/>
             <a:r>
-              <a:rPr lang="en-US" smtClean="0"/>
+              <a:rPr lang="en-US"/>
               <a:t>Fourth level</a:t>
             </a:r>
           </a:p>
           <a:p>
             <a:pPr lvl="4"/>
             <a:r>
-              <a:rPr lang="en-US" smtClean="0"/>
+              <a:rPr lang="en-US"/>
               <a:t>Fifth level</a:t>
             </a:r>
             <a:endParaRPr lang="en-US" dirty="0"/>
@@ -1162,35 +1162,35 @@
           <a:p>
             <a:pPr lvl="0"/>
             <a:r>
-              <a:rPr lang="en-US" smtClean="0"/>
+              <a:rPr lang="en-US"/>
               <a:t>Click to edit Master text styles</a:t>
             </a:r>
           </a:p>
           <a:p>
             <a:pPr lvl="1"/>
             <a:r>
-              <a:rPr lang="en-US" smtClean="0"/>
+              <a:rPr lang="en-US"/>
               <a:t>Second level</a:t>
             </a:r>
           </a:p>
           <a:p>
             <a:pPr lvl="2"/>
             <a:r>
-              <a:rPr lang="en-US" smtClean="0"/>
+              <a:rPr lang="en-US"/>
               <a:t>Third level</a:t>
             </a:r>
           </a:p>
           <a:p>
             <a:pPr lvl="3"/>
             <a:r>
-              <a:rPr lang="en-US" smtClean="0"/>
+              <a:rPr lang="en-US"/>
               <a:t>Fourth level</a:t>
             </a:r>
           </a:p>
           <a:p>
             <a:pPr lvl="4"/>
             <a:r>
-              <a:rPr lang="en-US" smtClean="0"/>
+              <a:rPr lang="en-US"/>
               <a:t>Fifth level</a:t>
             </a:r>
             <a:endParaRPr lang="en-US" dirty="0"/>
@@ -1214,7 +1214,7 @@
           <a:p>
             <a:fld id="{C9B7F90D-19C5-FD43-B6A2-9EB007BFA57B}" type="datetimeFigureOut">
               <a:rPr lang="en-US" smtClean="0"/>
-              <a:t>4/16/21</a:t>
+              <a:t>2/8/23</a:t>
             </a:fld>
             <a:endParaRPr lang="en-US"/>
           </a:p>
@@ -1308,7 +1308,7 @@
           <a:lstStyle/>
           <a:p>
             <a:r>
-              <a:rPr lang="en-US" smtClean="0"/>
+              <a:rPr lang="en-US"/>
               <a:t>Click to edit Master title style</a:t>
             </a:r>
             <a:endParaRPr lang="en-US" dirty="0"/>
@@ -1374,7 +1374,7 @@
           <a:p>
             <a:pPr lvl="0"/>
             <a:r>
-              <a:rPr lang="en-US" smtClean="0"/>
+              <a:rPr lang="en-US"/>
               <a:t>Click to edit Master text styles</a:t>
             </a:r>
           </a:p>
@@ -1402,35 +1402,35 @@
           <a:p>
             <a:pPr lvl="0"/>
             <a:r>
-              <a:rPr lang="en-US" smtClean="0"/>
+              <a:rPr lang="en-US"/>
               <a:t>Click to edit Master text styles</a:t>
             </a:r>
           </a:p>
           <a:p>
             <a:pPr lvl="1"/>
             <a:r>
-              <a:rPr lang="en-US" smtClean="0"/>
+              <a:rPr lang="en-US"/>
               <a:t>Second level</a:t>
             </a:r>
           </a:p>
           <a:p>
             <a:pPr lvl="2"/>
             <a:r>
-              <a:rPr lang="en-US" smtClean="0"/>
+              <a:rPr lang="en-US"/>
               <a:t>Third level</a:t>
             </a:r>
           </a:p>
           <a:p>
             <a:pPr lvl="3"/>
             <a:r>
-              <a:rPr lang="en-US" smtClean="0"/>
+              <a:rPr lang="en-US"/>
               <a:t>Fourth level</a:t>
             </a:r>
           </a:p>
           <a:p>
             <a:pPr lvl="4"/>
             <a:r>
-              <a:rPr lang="en-US" smtClean="0"/>
+              <a:rPr lang="en-US"/>
               <a:t>Fifth level</a:t>
             </a:r>
             <a:endParaRPr lang="en-US" dirty="0"/>
@@ -1496,7 +1496,7 @@
           <a:p>
             <a:pPr lvl="0"/>
             <a:r>
-              <a:rPr lang="en-US" smtClean="0"/>
+              <a:rPr lang="en-US"/>
               <a:t>Click to edit Master text styles</a:t>
             </a:r>
           </a:p>
@@ -1524,35 +1524,35 @@
           <a:p>
             <a:pPr lvl="0"/>
             <a:r>
-              <a:rPr lang="en-US" smtClean="0"/>
+              <a:rPr lang="en-US"/>
               <a:t>Click to edit Master text styles</a:t>
             </a:r>
           </a:p>
           <a:p>
             <a:pPr lvl="1"/>
             <a:r>
-              <a:rPr lang="en-US" smtClean="0"/>
+              <a:rPr lang="en-US"/>
               <a:t>Second level</a:t>
             </a:r>
           </a:p>
           <a:p>
             <a:pPr lvl="2"/>
             <a:r>
-              <a:rPr lang="en-US" smtClean="0"/>
+              <a:rPr lang="en-US"/>
               <a:t>Third level</a:t>
             </a:r>
           </a:p>
           <a:p>
             <a:pPr lvl="3"/>
             <a:r>
-              <a:rPr lang="en-US" smtClean="0"/>
+              <a:rPr lang="en-US"/>
               <a:t>Fourth level</a:t>
             </a:r>
           </a:p>
           <a:p>
             <a:pPr lvl="4"/>
             <a:r>
-              <a:rPr lang="en-US" smtClean="0"/>
+              <a:rPr lang="en-US"/>
               <a:t>Fifth level</a:t>
             </a:r>
             <a:endParaRPr lang="en-US" dirty="0"/>
@@ -1576,7 +1576,7 @@
           <a:p>
             <a:fld id="{C9B7F90D-19C5-FD43-B6A2-9EB007BFA57B}" type="datetimeFigureOut">
               <a:rPr lang="en-US" smtClean="0"/>
-              <a:t>4/16/21</a:t>
+              <a:t>2/8/23</a:t>
             </a:fld>
             <a:endParaRPr lang="en-US"/>
           </a:p>
@@ -1665,7 +1665,7 @@
           <a:lstStyle/>
           <a:p>
             <a:r>
-              <a:rPr lang="en-US" smtClean="0"/>
+              <a:rPr lang="en-US"/>
               <a:t>Click to edit Master title style</a:t>
             </a:r>
             <a:endParaRPr lang="en-US" dirty="0"/>
@@ -1689,7 +1689,7 @@
           <a:p>
             <a:fld id="{C9B7F90D-19C5-FD43-B6A2-9EB007BFA57B}" type="datetimeFigureOut">
               <a:rPr lang="en-US" smtClean="0"/>
-              <a:t>4/16/21</a:t>
+              <a:t>2/8/23</a:t>
             </a:fld>
             <a:endParaRPr lang="en-US"/>
           </a:p>
@@ -1779,7 +1779,7 @@
           <a:p>
             <a:fld id="{C9B7F90D-19C5-FD43-B6A2-9EB007BFA57B}" type="datetimeFigureOut">
               <a:rPr lang="en-US" smtClean="0"/>
-              <a:t>4/16/21</a:t>
+              <a:t>2/8/23</a:t>
             </a:fld>
             <a:endParaRPr lang="en-US"/>
           </a:p>
@@ -1877,7 +1877,7 @@
           </a:lstStyle>
           <a:p>
             <a:r>
-              <a:rPr lang="en-US" smtClean="0"/>
+              <a:rPr lang="en-US"/>
               <a:t>Click to edit Master title style</a:t>
             </a:r>
             <a:endParaRPr lang="en-US" dirty="0"/>
@@ -1934,35 +1934,35 @@
           <a:p>
             <a:pPr lvl="0"/>
             <a:r>
-              <a:rPr lang="en-US" smtClean="0"/>
+              <a:rPr lang="en-US"/>
               <a:t>Click to edit Master text styles</a:t>
             </a:r>
           </a:p>
           <a:p>
             <a:pPr lvl="1"/>
             <a:r>
-              <a:rPr lang="en-US" smtClean="0"/>
+              <a:rPr lang="en-US"/>
               <a:t>Second level</a:t>
             </a:r>
           </a:p>
           <a:p>
             <a:pPr lvl="2"/>
             <a:r>
-              <a:rPr lang="en-US" smtClean="0"/>
+              <a:rPr lang="en-US"/>
               <a:t>Third level</a:t>
             </a:r>
           </a:p>
           <a:p>
             <a:pPr lvl="3"/>
             <a:r>
-              <a:rPr lang="en-US" smtClean="0"/>
+              <a:rPr lang="en-US"/>
               <a:t>Fourth level</a:t>
             </a:r>
           </a:p>
           <a:p>
             <a:pPr lvl="4"/>
             <a:r>
-              <a:rPr lang="en-US" smtClean="0"/>
+              <a:rPr lang="en-US"/>
               <a:t>Fifth level</a:t>
             </a:r>
             <a:endParaRPr lang="en-US" dirty="0"/>
@@ -2028,7 +2028,7 @@
           <a:p>
             <a:pPr lvl="0"/>
             <a:r>
-              <a:rPr lang="en-US" smtClean="0"/>
+              <a:rPr lang="en-US"/>
               <a:t>Click to edit Master text styles</a:t>
             </a:r>
           </a:p>
@@ -2051,7 +2051,7 @@
           <a:p>
             <a:fld id="{C9B7F90D-19C5-FD43-B6A2-9EB007BFA57B}" type="datetimeFigureOut">
               <a:rPr lang="en-US" smtClean="0"/>
-              <a:t>4/16/21</a:t>
+              <a:t>2/8/23</a:t>
             </a:fld>
             <a:endParaRPr lang="en-US"/>
           </a:p>
@@ -2149,7 +2149,7 @@
           </a:lstStyle>
           <a:p>
             <a:r>
-              <a:rPr lang="en-US" smtClean="0"/>
+              <a:rPr lang="en-US"/>
               <a:t>Click to edit Master title style</a:t>
             </a:r>
             <a:endParaRPr lang="en-US" dirty="0"/>
@@ -2214,7 +2214,7 @@
           </a:lstStyle>
           <a:p>
             <a:r>
-              <a:rPr lang="en-US" smtClean="0"/>
+              <a:rPr lang="en-US"/>
               <a:t>Drag picture to placeholder or click icon to add</a:t>
             </a:r>
             <a:endParaRPr lang="en-US" dirty="0"/>
@@ -2280,7 +2280,7 @@
           <a:p>
             <a:pPr lvl="0"/>
             <a:r>
-              <a:rPr lang="en-US" smtClean="0"/>
+              <a:rPr lang="en-US"/>
               <a:t>Click to edit Master text styles</a:t>
             </a:r>
           </a:p>
@@ -2303,7 +2303,7 @@
           <a:p>
             <a:fld id="{C9B7F90D-19C5-FD43-B6A2-9EB007BFA57B}" type="datetimeFigureOut">
               <a:rPr lang="en-US" smtClean="0"/>
-              <a:t>4/16/21</a:t>
+              <a:t>2/8/23</a:t>
             </a:fld>
             <a:endParaRPr lang="en-US"/>
           </a:p>
@@ -2407,7 +2407,7 @@
           <a:lstStyle/>
           <a:p>
             <a:r>
-              <a:rPr lang="en-US" smtClean="0"/>
+              <a:rPr lang="en-US"/>
               <a:t>Click to edit Master title style</a:t>
             </a:r>
             <a:endParaRPr lang="en-US" dirty="0"/>
@@ -2441,35 +2441,35 @@
           <a:p>
             <a:pPr lvl="0"/>
             <a:r>
-              <a:rPr lang="en-US" smtClean="0"/>
+              <a:rPr lang="en-US"/>
               <a:t>Click to edit Master text styles</a:t>
             </a:r>
           </a:p>
           <a:p>
             <a:pPr lvl="1"/>
             <a:r>
-              <a:rPr lang="en-US" smtClean="0"/>
+              <a:rPr lang="en-US"/>
               <a:t>Second level</a:t>
             </a:r>
           </a:p>
           <a:p>
             <a:pPr lvl="2"/>
             <a:r>
-              <a:rPr lang="en-US" smtClean="0"/>
+              <a:rPr lang="en-US"/>
               <a:t>Third level</a:t>
             </a:r>
           </a:p>
           <a:p>
             <a:pPr lvl="3"/>
             <a:r>
-              <a:rPr lang="en-US" smtClean="0"/>
+              <a:rPr lang="en-US"/>
               <a:t>Fourth level</a:t>
             </a:r>
           </a:p>
           <a:p>
             <a:pPr lvl="4"/>
             <a:r>
-              <a:rPr lang="en-US" smtClean="0"/>
+              <a:rPr lang="en-US"/>
               <a:t>Fifth level</a:t>
             </a:r>
             <a:endParaRPr lang="en-US" dirty="0"/>
@@ -2511,7 +2511,7 @@
           <a:p>
             <a:fld id="{C9B7F90D-19C5-FD43-B6A2-9EB007BFA57B}" type="datetimeFigureOut">
               <a:rPr lang="en-US" smtClean="0"/>
-              <a:t>4/16/21</a:t>
+              <a:t>2/8/23</a:t>
             </a:fld>
             <a:endParaRPr lang="en-US"/>
           </a:p>
@@ -3338,14 +3338,14 @@
             <a:p>
               <a:pPr algn="ctr"/>
               <a:r>
-                <a:rPr lang="en-US" sz="900" dirty="0" smtClean="0">
+                <a:rPr lang="en-US" sz="900" dirty="0">
                   <a:solidFill>
                     <a:sysClr val="windowText" lastClr="000000"/>
                   </a:solidFill>
                 </a:rPr>
                 <a:t>Scottish Population</a:t>
               </a:r>
-              <a:endParaRPr lang="en-US" sz="900" dirty="0" smtClean="0">
+              <a:endParaRPr lang="en-US" sz="900" dirty="0">
                 <a:solidFill>
                   <a:schemeClr val="tx1"/>
                 </a:solidFill>
@@ -3362,18 +3362,13 @@
                 <a:t>≈ </a:t>
               </a:r>
               <a:r>
-                <a:rPr lang="en-US" sz="700" dirty="0" smtClean="0">
+                <a:rPr lang="en-US" sz="700" dirty="0">
                   <a:solidFill>
                     <a:sysClr val="windowText" lastClr="000000"/>
                   </a:solidFill>
                 </a:rPr>
                 <a:t>5,500,000</a:t>
               </a:r>
-              <a:endParaRPr lang="en-US" sz="700" dirty="0">
-                <a:solidFill>
-                  <a:sysClr val="windowText" lastClr="000000"/>
-                </a:solidFill>
-              </a:endParaRPr>
             </a:p>
           </p:txBody>
         </p:sp>
@@ -3426,7 +3421,7 @@
             <a:p>
               <a:pPr algn="ctr"/>
               <a:r>
-                <a:rPr lang="en-US" sz="900" dirty="0" smtClean="0">
+                <a:rPr lang="en-US" sz="900" dirty="0">
                   <a:solidFill>
                     <a:sysClr val="windowText" lastClr="000000"/>
                   </a:solidFill>
@@ -3437,18 +3432,13 @@
             <a:p>
               <a:pPr algn="ctr"/>
               <a:r>
-                <a:rPr lang="en-US" sz="700" dirty="0" smtClean="0">
+                <a:rPr lang="en-US" sz="700" dirty="0">
                   <a:solidFill>
                     <a:sysClr val="windowText" lastClr="000000"/>
                   </a:solidFill>
                 </a:rPr>
                 <a:t>Records 2013-17</a:t>
               </a:r>
-              <a:endParaRPr lang="en-US" sz="700" dirty="0">
-                <a:solidFill>
-                  <a:sysClr val="windowText" lastClr="000000"/>
-                </a:solidFill>
-              </a:endParaRPr>
             </a:p>
           </p:txBody>
         </p:sp>
@@ -3502,7 +3492,7 @@
           <a:p>
             <a:pPr algn="ctr"/>
             <a:r>
-              <a:rPr lang="en-US" sz="1000" dirty="0" smtClean="0">
+              <a:rPr lang="en-US" sz="1000" dirty="0">
                 <a:solidFill>
                   <a:sysClr val="windowText" lastClr="000000"/>
                 </a:solidFill>
@@ -3513,26 +3503,21 @@
           <a:p>
             <a:pPr algn="ctr"/>
             <a:r>
-              <a:rPr lang="is-IS" dirty="0" smtClean="0">
+              <a:rPr lang="is-IS" dirty="0">
                 <a:solidFill>
                   <a:sysClr val="windowText" lastClr="000000"/>
                 </a:solidFill>
               </a:rPr>
-              <a:t>16,142,279 </a:t>
-            </a:r>
-            <a:r>
-              <a:rPr lang="en-US" dirty="0" smtClean="0">
+              <a:t>17,488,596 </a:t>
+            </a:r>
+            <a:r>
+              <a:rPr lang="en-US" dirty="0">
                 <a:solidFill>
                   <a:sysClr val="windowText" lastClr="000000"/>
                 </a:solidFill>
               </a:rPr>
               <a:t>individual-time pairs</a:t>
             </a:r>
-            <a:endParaRPr lang="en-US" dirty="0">
-              <a:solidFill>
-                <a:sysClr val="windowText" lastClr="000000"/>
-              </a:solidFill>
-            </a:endParaRPr>
           </a:p>
         </p:txBody>
       </p:sp>
@@ -3585,7 +3570,7 @@
           <a:p>
             <a:pPr algn="ctr"/>
             <a:r>
-              <a:rPr lang="en-US" sz="1000" dirty="0" smtClean="0">
+              <a:rPr lang="en-US" sz="1000" dirty="0">
                 <a:solidFill>
                   <a:sysClr val="windowText" lastClr="000000"/>
                 </a:solidFill>
@@ -3596,12 +3581,12 @@
           <a:p>
             <a:pPr algn="ctr"/>
             <a:r>
-              <a:rPr lang="is-IS" dirty="0" smtClean="0">
+              <a:rPr lang="is-IS" dirty="0">
                 <a:solidFill>
                   <a:sysClr val="windowText" lastClr="000000"/>
                 </a:solidFill>
               </a:rPr>
-              <a:t>12,957,648 individual-time pairs </a:t>
+              <a:t>12,866,084 individual-time pairs </a:t>
             </a:r>
             <a:endParaRPr lang="en-US" dirty="0">
               <a:solidFill>
@@ -3733,7 +3718,7 @@
           <a:lstStyle/>
           <a:p>
             <a:r>
-              <a:rPr lang="en-US" sz="800" dirty="0" smtClean="0">
+              <a:rPr lang="en-US" sz="800" dirty="0">
                 <a:solidFill>
                   <a:sysClr val="windowText" lastClr="000000"/>
                 </a:solidFill>
@@ -3741,17 +3726,17 @@
               <a:t>Deceased by time cutoff: </a:t>
             </a:r>
             <a:r>
-              <a:rPr lang="is-IS" sz="800" dirty="0" smtClean="0">
+              <a:rPr lang="is-IS" sz="800" dirty="0">
                 <a:solidFill>
                   <a:sysClr val="windowText" lastClr="000000"/>
                 </a:solidFill>
               </a:rPr>
-              <a:t>504,279</a:t>
-            </a:r>
-          </a:p>
-          <a:p>
-            <a:r>
-              <a:rPr lang="en-US" sz="800" dirty="0" smtClean="0">
+              <a:t>585,322</a:t>
+            </a:r>
+          </a:p>
+          <a:p>
+            <a:r>
+              <a:rPr lang="en-US" sz="800" dirty="0">
                 <a:solidFill>
                   <a:sysClr val="windowText" lastClr="000000"/>
                 </a:solidFill>
@@ -3759,12 +3744,12 @@
               <a:t>No valid v3 score: </a:t>
             </a:r>
             <a:r>
-              <a:rPr lang="is-IS" sz="800" dirty="0" smtClean="0">
+              <a:rPr lang="is-IS" sz="800" dirty="0">
                 <a:solidFill>
                   <a:sysClr val="windowText" lastClr="000000"/>
                 </a:solidFill>
               </a:rPr>
-              <a:t>2,680,352</a:t>
+              <a:t>4,037,190</a:t>
             </a:r>
             <a:endParaRPr lang="en-US" sz="800" dirty="0">
               <a:solidFill>
@@ -3837,31 +3822,18 @@
             <a:p>
               <a:pPr algn="ctr"/>
               <a:r>
-                <a:rPr lang="en-US" sz="1000" dirty="0" smtClean="0">
+                <a:rPr lang="en-US" sz="1000" dirty="0">
                   <a:solidFill>
                     <a:sysClr val="windowText" lastClr="000000"/>
                   </a:solidFill>
                 </a:rPr>
-                <a:t>Training </a:t>
+                <a:t>Training set (3x)</a:t>
               </a:r>
-              <a:r>
-                <a:rPr lang="en-US" sz="1000" dirty="0" smtClean="0">
-                  <a:solidFill>
-                    <a:sysClr val="windowText" lastClr="000000"/>
-                  </a:solidFill>
-                </a:rPr>
-                <a:t>set (3x)</a:t>
-              </a:r>
-              <a:endParaRPr lang="en-US" sz="1000" dirty="0" smtClean="0">
-                <a:solidFill>
-                  <a:sysClr val="windowText" lastClr="000000"/>
-                </a:solidFill>
-              </a:endParaRPr>
             </a:p>
             <a:p>
               <a:pPr algn="ctr"/>
               <a:r>
-                <a:rPr lang="is-IS" dirty="0" smtClean="0">
+                <a:rPr lang="is-IS" dirty="0">
                   <a:solidFill>
                     <a:sysClr val="windowText" lastClr="000000"/>
                   </a:solidFill>
@@ -3925,31 +3897,18 @@
             <a:p>
               <a:pPr algn="ctr"/>
               <a:r>
-                <a:rPr lang="en-US" sz="1000" dirty="0" smtClean="0">
+                <a:rPr lang="en-US" sz="1000" dirty="0">
                   <a:solidFill>
                     <a:sysClr val="windowText" lastClr="000000"/>
                   </a:solidFill>
                 </a:rPr>
-                <a:t>Test </a:t>
+                <a:t>Test set (3x)</a:t>
               </a:r>
-              <a:r>
-                <a:rPr lang="en-US" sz="1000" dirty="0" smtClean="0">
-                  <a:solidFill>
-                    <a:sysClr val="windowText" lastClr="000000"/>
-                  </a:solidFill>
-                </a:rPr>
-                <a:t>set (3x)</a:t>
-              </a:r>
-              <a:endParaRPr lang="en-US" sz="1000" dirty="0" smtClean="0">
-                <a:solidFill>
-                  <a:sysClr val="windowText" lastClr="000000"/>
-                </a:solidFill>
-              </a:endParaRPr>
             </a:p>
             <a:p>
               <a:pPr algn="ctr"/>
               <a:r>
-                <a:rPr lang="is-IS" dirty="0" smtClean="0">
+                <a:rPr lang="is-IS" dirty="0">
                   <a:solidFill>
                     <a:sysClr val="windowText" lastClr="000000"/>
                   </a:solidFill>
@@ -4147,7 +4106,7 @@
           <a:p>
             <a:pPr algn="ctr"/>
             <a:r>
-              <a:rPr lang="en-AU" sz="1000" smtClean="0">
+              <a:rPr lang="en-AU" sz="1000">
                 <a:solidFill>
                   <a:sysClr val="windowText" lastClr="000000"/>
                 </a:solidFill>
@@ -4317,7 +4276,7 @@
             <a:p>
               <a:pPr algn="ctr"/>
               <a:r>
-                <a:rPr lang="en-US" sz="1000" dirty="0" smtClean="0">
+                <a:rPr lang="en-US" sz="1000" dirty="0">
                   <a:solidFill>
                     <a:sysClr val="windowText" lastClr="000000"/>
                   </a:solidFill>
@@ -4376,7 +4335,7 @@
             <a:p>
               <a:pPr algn="ctr"/>
               <a:r>
-                <a:rPr lang="en-US" sz="1000" dirty="0" smtClean="0">
+                <a:rPr lang="en-US" sz="1000" dirty="0">
                   <a:solidFill>
                     <a:sysClr val="windowText" lastClr="000000"/>
                   </a:solidFill>
@@ -4446,15 +4405,7 @@
                   <a:sysClr val="windowText" lastClr="000000"/>
                 </a:solidFill>
               </a:rPr>
-              <a:t>Electronic Health </a:t>
-            </a:r>
-            <a:r>
-              <a:rPr lang="en-US" sz="1000" dirty="0" smtClean="0">
-                <a:solidFill>
-                  <a:sysClr val="windowText" lastClr="000000"/>
-                </a:solidFill>
-              </a:rPr>
-              <a:t>Records</a:t>
+              <a:t>Electronic Health Records</a:t>
             </a:r>
           </a:p>
           <a:p>
@@ -4468,28 +4419,12 @@
               <a:t>≈ </a:t>
             </a:r>
             <a:r>
-              <a:rPr lang="en-US" sz="800" dirty="0" smtClean="0">
-                <a:solidFill>
-                  <a:sysClr val="windowText" lastClr="000000"/>
-                </a:solidFill>
-              </a:rPr>
-              <a:t>5,000,000 </a:t>
-            </a:r>
-            <a:r>
               <a:rPr lang="en-US" sz="800" dirty="0">
                 <a:solidFill>
                   <a:sysClr val="windowText" lastClr="000000"/>
                 </a:solidFill>
               </a:rPr>
-              <a:t>individual-time </a:t>
-            </a:r>
-            <a:r>
-              <a:rPr lang="en-US" sz="800" dirty="0" smtClean="0">
-                <a:solidFill>
-                  <a:sysClr val="windowText" lastClr="000000"/>
-                </a:solidFill>
-              </a:rPr>
-              <a:t>pairs  </a:t>
+              <a:t>5,000,000 individual-time pairs  </a:t>
             </a:r>
           </a:p>
         </p:txBody>
@@ -4653,7 +4588,7 @@
           <a:lstStyle/>
           <a:p>
             <a:r>
-              <a:rPr lang="en-US" sz="800" dirty="0" smtClean="0">
+              <a:rPr lang="en-US" sz="800" dirty="0">
                 <a:solidFill>
                   <a:sysClr val="windowText" lastClr="000000"/>
                 </a:solidFill>
@@ -4661,7 +4596,7 @@
               <a:t>Cannot </a:t>
             </a:r>
             <a:r>
-              <a:rPr lang="en-US" sz="800" smtClean="0">
+              <a:rPr lang="en-US" sz="800">
                 <a:solidFill>
                   <a:sysClr val="windowText" lastClr="000000"/>
                 </a:solidFill>
@@ -4725,7 +4660,7 @@
           <a:p>
             <a:pPr algn="ctr"/>
             <a:r>
-              <a:rPr lang="en-US" sz="1000" dirty="0" smtClean="0">
+              <a:rPr lang="en-US" sz="1000" dirty="0">
                 <a:solidFill>
                   <a:sysClr val="windowText" lastClr="000000"/>
                 </a:solidFill>
@@ -4744,18 +4679,13 @@
               <a:t>≈ </a:t>
             </a:r>
             <a:r>
-              <a:rPr lang="en-US" dirty="0" smtClean="0">
+              <a:rPr lang="en-US" dirty="0">
                 <a:solidFill>
                   <a:sysClr val="windowText" lastClr="000000"/>
                 </a:solidFill>
               </a:rPr>
               <a:t>4,300,000</a:t>
             </a:r>
-            <a:endParaRPr lang="en-US" dirty="0">
-              <a:solidFill>
-                <a:sysClr val="windowText" lastClr="000000"/>
-              </a:solidFill>
-            </a:endParaRPr>
           </a:p>
         </p:txBody>
       </p:sp>
@@ -4808,7 +4738,7 @@
           <a:p>
             <a:pPr algn="ctr"/>
             <a:r>
-              <a:rPr lang="en-AU" sz="1000" dirty="0" smtClean="0">
+              <a:rPr lang="en-AU" sz="1000" dirty="0">
                 <a:solidFill>
                   <a:sysClr val="windowText" lastClr="000000"/>
                 </a:solidFill>
@@ -4886,7 +4816,7 @@
             <a:p>
               <a:pPr algn="ctr"/>
               <a:r>
-                <a:rPr lang="en-AU" sz="800" dirty="0" smtClean="0">
+                <a:rPr lang="en-AU" sz="800" dirty="0">
                   <a:solidFill>
                     <a:sysClr val="windowText" lastClr="000000"/>
                   </a:solidFill>
@@ -4950,7 +4880,7 @@
             <a:p>
               <a:pPr algn="ctr"/>
               <a:r>
-                <a:rPr lang="en-AU" sz="800" dirty="0" smtClean="0">
+                <a:rPr lang="en-AU" sz="800" dirty="0">
                   <a:solidFill>
                     <a:sysClr val="windowText" lastClr="000000"/>
                   </a:solidFill>
@@ -4998,21 +4928,8 @@
                   <a:sysClr val="windowText" lastClr="000000"/>
                 </a:solidFill>
               </a:rPr>
-              <a:t>Model </a:t>
-            </a:r>
-            <a:r>
-              <a:rPr lang="en-US" sz="1400" dirty="0" smtClean="0">
-                <a:solidFill>
-                  <a:sysClr val="windowText" lastClr="000000"/>
-                </a:solidFill>
-              </a:rPr>
-              <a:t>deployment</a:t>
-            </a:r>
-            <a:endParaRPr lang="en-US" sz="1400" dirty="0">
-              <a:solidFill>
-                <a:sysClr val="windowText" lastClr="000000"/>
-              </a:solidFill>
-            </a:endParaRPr>
+              <a:t>Model deployment</a:t>
+            </a:r>
           </a:p>
         </p:txBody>
       </p:sp>

</xml_diff>